<commit_message>
shift to namespace first topics
</commit_message>
<xml_diff>
--- a/content/designs/command/atlas-command.pptx
+++ b/content/designs/command/atlas-command.pptx
@@ -8,7 +8,7 @@
     <p:notesMasterId r:id="rId3"/>
   </p:notesMasterIdLst>
   <p:sldIdLst>
-    <p:sldId id="258" r:id="rId2"/>
+    <p:sldId id="257" r:id="rId2"/>
   </p:sldIdLst>
   <p:sldSz cx="13004800" cy="9753600"/>
   <p:notesSz cx="6858000" cy="9144000"/>
@@ -2128,7 +2128,7 @@
           </a:ln>
           <a:extLst>
             <a:ext uri="{C572A759-6A51-4108-AA02-DFA0A04FC94B}">
-              <ma14:wrappingTextBoxFlag xmlns:ma14="http://schemas.microsoft.com/office/mac/drawingml/2011/main" xmlns="" val="1"/>
+              <ma14:wrappingTextBoxFlag xmlns="" xmlns:ma14="http://schemas.microsoft.com/office/mac/drawingml/2011/main" val="1"/>
             </a:ext>
           </a:extLst>
         </p:spPr>
@@ -2167,7 +2167,7 @@
           </a:ln>
           <a:extLst>
             <a:ext uri="{C572A759-6A51-4108-AA02-DFA0A04FC94B}">
-              <ma14:wrappingTextBoxFlag xmlns:ma14="http://schemas.microsoft.com/office/mac/drawingml/2011/main" xmlns="" val="1"/>
+              <ma14:wrappingTextBoxFlag xmlns="" xmlns:ma14="http://schemas.microsoft.com/office/mac/drawingml/2011/main" val="1"/>
             </a:ext>
           </a:extLst>
         </p:spPr>
@@ -3122,8 +3122,8 @@
         </p:nvSpPr>
         <p:spPr>
           <a:xfrm>
-            <a:off x="4746932" y="2158999"/>
-            <a:ext cx="2041104" cy="457201"/>
+            <a:off x="4746932" y="2151638"/>
+            <a:ext cx="2055050" cy="471924"/>
           </a:xfrm>
           <a:prstGeom prst="rect">
             <a:avLst/>
@@ -3133,7 +3133,7 @@
           </a:ln>
           <a:extLst>
             <a:ext uri="{C572A759-6A51-4108-AA02-DFA0A04FC94B}">
-              <ma14:wrappingTextBoxFlag xmlns:ma14="http://schemas.microsoft.com/office/mac/drawingml/2011/main" xmlns="" val="1"/>
+              <ma14:wrappingTextBoxFlag xmlns="" xmlns:ma14="http://schemas.microsoft.com/office/mac/drawingml/2011/main" val="1"/>
             </a:ext>
           </a:extLst>
         </p:spPr>
@@ -3152,8 +3152,22 @@
               </a:defRPr>
             </a:pPr>
             <a:r>
-              <a:t>deviceID/commands</a:t>
+              <a:rPr lang="en-US" dirty="0"/>
+              <a:t>c</a:t>
             </a:r>
+            <a:r>
+              <a:rPr dirty="0"/>
+              <a:t>ommands</a:t>
+            </a:r>
+            <a:r>
+              <a:rPr lang="en-US" dirty="0"/>
+              <a:t>/</a:t>
+            </a:r>
+            <a:r>
+              <a:rPr lang="en-US" dirty="0" err="1"/>
+              <a:t>deviceID</a:t>
+            </a:r>
+            <a:endParaRPr dirty="0"/>
           </a:p>
           <a:p>
             <a:pPr algn="l">
@@ -3165,7 +3179,24 @@
               </a:defRPr>
             </a:pPr>
             <a:r>
-              <a:t>deviceID/commands/ack</a:t>
+              <a:rPr lang="en-US" dirty="0"/>
+              <a:t>c</a:t>
+            </a:r>
+            <a:r>
+              <a:rPr dirty="0"/>
+              <a:t>ommands</a:t>
+            </a:r>
+            <a:r>
+              <a:rPr lang="en-US" dirty="0"/>
+              <a:t>/</a:t>
+            </a:r>
+            <a:r>
+              <a:rPr lang="en-US" dirty="0" err="1"/>
+              <a:t>deviceID</a:t>
+            </a:r>
+            <a:r>
+              <a:rPr dirty="0"/>
+              <a:t>/ack</a:t>
             </a:r>
           </a:p>
         </p:txBody>
@@ -3222,7 +3253,7 @@
           </a:ln>
           <a:extLst>
             <a:ext uri="{C572A759-6A51-4108-AA02-DFA0A04FC94B}">
-              <ma14:wrappingTextBoxFlag xmlns:ma14="http://schemas.microsoft.com/office/mac/drawingml/2011/main" xmlns="" val="1"/>
+              <ma14:wrappingTextBoxFlag xmlns="" xmlns:ma14="http://schemas.microsoft.com/office/mac/drawingml/2011/main" val="1"/>
             </a:ext>
           </a:extLst>
         </p:spPr>
@@ -3270,7 +3301,7 @@
           <a:effectLst/>
           <a:extLst>
             <a:ext uri="{C572A759-6A51-4108-AA02-DFA0A04FC94B}">
-              <ma14:wrappingTextBoxFlag xmlns:ma14="http://schemas.microsoft.com/office/mac/drawingml/2011/main" xmlns="" val="1"/>
+              <ma14:wrappingTextBoxFlag xmlns="" xmlns:ma14="http://schemas.microsoft.com/office/mac/drawingml/2011/main" val="1"/>
             </a:ext>
           </a:extLst>
         </p:spPr>
@@ -3372,7 +3403,7 @@
           </a:ln>
           <a:extLst>
             <a:ext uri="{C572A759-6A51-4108-AA02-DFA0A04FC94B}">
-              <ma14:wrappingTextBoxFlag xmlns:ma14="http://schemas.microsoft.com/office/mac/drawingml/2011/main" xmlns="" val="1"/>
+              <ma14:wrappingTextBoxFlag xmlns="" xmlns:ma14="http://schemas.microsoft.com/office/mac/drawingml/2011/main" val="1"/>
             </a:ext>
           </a:extLst>
         </p:spPr>
@@ -3426,7 +3457,7 @@
           </a:ln>
           <a:extLst>
             <a:ext uri="{C572A759-6A51-4108-AA02-DFA0A04FC94B}">
-              <ma14:wrappingTextBoxFlag xmlns:ma14="http://schemas.microsoft.com/office/mac/drawingml/2011/main" xmlns="" val="1"/>
+              <ma14:wrappingTextBoxFlag xmlns="" xmlns:ma14="http://schemas.microsoft.com/office/mac/drawingml/2011/main" val="1"/>
             </a:ext>
           </a:extLst>
         </p:spPr>
@@ -3617,7 +3648,7 @@
           </a:ln>
           <a:extLst>
             <a:ext uri="{C572A759-6A51-4108-AA02-DFA0A04FC94B}">
-              <ma14:wrappingTextBoxFlag xmlns:ma14="http://schemas.microsoft.com/office/mac/drawingml/2011/main" xmlns="" val="1"/>
+              <ma14:wrappingTextBoxFlag xmlns="" xmlns:ma14="http://schemas.microsoft.com/office/mac/drawingml/2011/main" val="1"/>
             </a:ext>
           </a:extLst>
         </p:spPr>
@@ -3732,7 +3763,7 @@
             <a:effectLst/>
             <a:extLst>
               <a:ext uri="{C572A759-6A51-4108-AA02-DFA0A04FC94B}">
-                <ma14:wrappingTextBoxFlag xmlns:ma14="http://schemas.microsoft.com/office/mac/drawingml/2011/main" xmlns="" val="1"/>
+                <ma14:wrappingTextBoxFlag xmlns="" xmlns:ma14="http://schemas.microsoft.com/office/mac/drawingml/2011/main" val="1"/>
               </a:ext>
             </a:extLst>
           </p:spPr>
@@ -3927,7 +3958,7 @@
           </a:ln>
           <a:extLst>
             <a:ext uri="{C572A759-6A51-4108-AA02-DFA0A04FC94B}">
-              <ma14:wrappingTextBoxFlag xmlns:ma14="http://schemas.microsoft.com/office/mac/drawingml/2011/main" xmlns="" val="1"/>
+              <ma14:wrappingTextBoxFlag xmlns="" xmlns:ma14="http://schemas.microsoft.com/office/mac/drawingml/2011/main" val="1"/>
             </a:ext>
           </a:extLst>
         </p:spPr>
@@ -4075,7 +4106,7 @@
             <a:effectLst/>
             <a:extLst>
               <a:ext uri="{C572A759-6A51-4108-AA02-DFA0A04FC94B}">
-                <ma14:wrappingTextBoxFlag xmlns:ma14="http://schemas.microsoft.com/office/mac/drawingml/2011/main" xmlns="" val="1"/>
+                <ma14:wrappingTextBoxFlag xmlns="" xmlns:ma14="http://schemas.microsoft.com/office/mac/drawingml/2011/main" val="1"/>
               </a:ext>
             </a:extLst>
           </p:spPr>
@@ -4193,7 +4224,7 @@
             <a:effectLst/>
             <a:extLst>
               <a:ext uri="{C572A759-6A51-4108-AA02-DFA0A04FC94B}">
-                <ma14:wrappingTextBoxFlag xmlns:ma14="http://schemas.microsoft.com/office/mac/drawingml/2011/main" xmlns="" val="1"/>
+                <ma14:wrappingTextBoxFlag xmlns="" xmlns:ma14="http://schemas.microsoft.com/office/mac/drawingml/2011/main" val="1"/>
               </a:ext>
             </a:extLst>
           </p:spPr>
@@ -4311,7 +4342,7 @@
             <a:effectLst/>
             <a:extLst>
               <a:ext uri="{C572A759-6A51-4108-AA02-DFA0A04FC94B}">
-                <ma14:wrappingTextBoxFlag xmlns:ma14="http://schemas.microsoft.com/office/mac/drawingml/2011/main" xmlns="" val="1"/>
+                <ma14:wrappingTextBoxFlag xmlns="" xmlns:ma14="http://schemas.microsoft.com/office/mac/drawingml/2011/main" val="1"/>
               </a:ext>
             </a:extLst>
           </p:spPr>
@@ -4445,7 +4476,7 @@
     </p:spTree>
     <p:extLst>
       <p:ext uri="{BB962C8B-B14F-4D97-AF65-F5344CB8AC3E}">
-        <p14:creationId xmlns:p14="http://schemas.microsoft.com/office/powerpoint/2010/main" val="2610353506"/>
+        <p14:creationId xmlns:p14="http://schemas.microsoft.com/office/powerpoint/2010/main" val="1130052452"/>
       </p:ext>
     </p:extLst>
   </p:cSld>

</xml_diff>